<commit_message>
[DEV] Texto e Apresentação 11-09-2019
</commit_message>
<xml_diff>
--- a/Texto e Apresentação/Apresentação Mentoria.pptx
+++ b/Texto e Apresentação/Apresentação Mentoria.pptx
@@ -216,7 +216,7 @@
           <a:p>
             <a:fld id="{BB52CE9F-3EF7-46EE-B391-82811D6E863C}" type="datetimeFigureOut">
               <a:rPr lang="pt-BR" smtClean="0"/>
-              <a:t>24/08/2019</a:t>
+              <a:t>26/08/2019</a:t>
             </a:fld>
             <a:endParaRPr lang="pt-BR"/>
           </a:p>
@@ -6106,6 +6106,50 @@
           </a:p>
         </p:txBody>
       </p:sp>
+      <p:sp>
+        <p:nvSpPr>
+          <p:cNvPr id="3" name="CaixaDeTexto 2">
+            <a:extLst>
+              <a:ext uri="{FF2B5EF4-FFF2-40B4-BE49-F238E27FC236}">
+                <a16:creationId xmlns:a16="http://schemas.microsoft.com/office/drawing/2014/main" id="{6B5365B2-9E5C-41B1-B603-3927D7488C25}"/>
+              </a:ext>
+            </a:extLst>
+          </p:cNvPr>
+          <p:cNvSpPr txBox="1"/>
+          <p:nvPr/>
+        </p:nvSpPr>
+        <p:spPr>
+          <a:xfrm>
+            <a:off x="3676948" y="1428446"/>
+            <a:ext cx="5131661" cy="400110"/>
+          </a:xfrm>
+          <a:prstGeom prst="rect">
+            <a:avLst/>
+          </a:prstGeom>
+          <a:noFill/>
+        </p:spPr>
+        <p:txBody>
+          <a:bodyPr wrap="none" rtlCol="0">
+            <a:spAutoFit/>
+          </a:bodyPr>
+          <a:lstStyle/>
+          <a:p>
+            <a:r>
+              <a:rPr lang="pt-BR" sz="2000" dirty="0">
+                <a:solidFill>
+                  <a:schemeClr val="bg1"/>
+                </a:solidFill>
+              </a:rPr>
+              <a:t>“Se não puder fazer tudo, faça tudo que puder”</a:t>
+            </a:r>
+            <a:endParaRPr lang="pt-BR" dirty="0">
+              <a:solidFill>
+                <a:schemeClr val="bg1"/>
+              </a:solidFill>
+            </a:endParaRPr>
+          </a:p>
+        </p:txBody>
+      </p:sp>
     </p:spTree>
     <p:extLst>
       <p:ext uri="{BB962C8B-B14F-4D97-AF65-F5344CB8AC3E}">
@@ -7024,8 +7068,13 @@
             </a:pPr>
             <a:r>
               <a:rPr lang="pt-BR" b="1" dirty="0"/>
-              <a:t>ESPECIALISTA DE DOMÍNINO</a:t>
-            </a:r>
+              <a:t>ESPECIALISTA </a:t>
+            </a:r>
+            <a:r>
+              <a:rPr lang="pt-BR" b="1"/>
+              <a:t>DE DOMÍNIO</a:t>
+            </a:r>
+            <a:endParaRPr lang="pt-BR" b="1" dirty="0"/>
           </a:p>
           <a:p>
             <a:pPr marL="0" indent="0" algn="just">

</xml_diff>